<commit_message>
Alpha package update 1 (major)
1. Added setup.py file for installation purposes and distribution.

2.  Updated MIT License agreement

3. Added TOML file, need to update the requirements

4. Create wind.py update with 10 functions (methods)

5. Graphics update of the workflow with open-source libraries
</commit_message>
<xml_diff>
--- a/Graphics/GIS_Workflow.pptx
+++ b/Graphics/GIS_Workflow.pptx
@@ -243,7 +243,7 @@
           <a:p>
             <a:fld id="{F72C1BCF-1929-4F52-BF96-F3A2DD98F1D0}" type="datetimeFigureOut">
               <a:rPr lang="en-US" smtClean="0"/>
-              <a:t>11/16/23</a:t>
+              <a:t>11/17/2023</a:t>
             </a:fld>
             <a:endParaRPr lang="en-US"/>
           </a:p>
@@ -413,7 +413,7 @@
           <a:p>
             <a:fld id="{F72C1BCF-1929-4F52-BF96-F3A2DD98F1D0}" type="datetimeFigureOut">
               <a:rPr lang="en-US" smtClean="0"/>
-              <a:t>11/16/23</a:t>
+              <a:t>11/17/2023</a:t>
             </a:fld>
             <a:endParaRPr lang="en-US"/>
           </a:p>
@@ -593,7 +593,7 @@
           <a:p>
             <a:fld id="{F72C1BCF-1929-4F52-BF96-F3A2DD98F1D0}" type="datetimeFigureOut">
               <a:rPr lang="en-US" smtClean="0"/>
-              <a:t>11/16/23</a:t>
+              <a:t>11/17/2023</a:t>
             </a:fld>
             <a:endParaRPr lang="en-US"/>
           </a:p>
@@ -763,7 +763,7 @@
           <a:p>
             <a:fld id="{F72C1BCF-1929-4F52-BF96-F3A2DD98F1D0}" type="datetimeFigureOut">
               <a:rPr lang="en-US" smtClean="0"/>
-              <a:t>11/16/23</a:t>
+              <a:t>11/17/2023</a:t>
             </a:fld>
             <a:endParaRPr lang="en-US"/>
           </a:p>
@@ -1007,7 +1007,7 @@
           <a:p>
             <a:fld id="{F72C1BCF-1929-4F52-BF96-F3A2DD98F1D0}" type="datetimeFigureOut">
               <a:rPr lang="en-US" smtClean="0"/>
-              <a:t>11/16/23</a:t>
+              <a:t>11/17/2023</a:t>
             </a:fld>
             <a:endParaRPr lang="en-US"/>
           </a:p>
@@ -1239,7 +1239,7 @@
           <a:p>
             <a:fld id="{F72C1BCF-1929-4F52-BF96-F3A2DD98F1D0}" type="datetimeFigureOut">
               <a:rPr lang="en-US" smtClean="0"/>
-              <a:t>11/16/23</a:t>
+              <a:t>11/17/2023</a:t>
             </a:fld>
             <a:endParaRPr lang="en-US"/>
           </a:p>
@@ -1606,7 +1606,7 @@
           <a:p>
             <a:fld id="{F72C1BCF-1929-4F52-BF96-F3A2DD98F1D0}" type="datetimeFigureOut">
               <a:rPr lang="en-US" smtClean="0"/>
-              <a:t>11/16/23</a:t>
+              <a:t>11/17/2023</a:t>
             </a:fld>
             <a:endParaRPr lang="en-US"/>
           </a:p>
@@ -1724,7 +1724,7 @@
           <a:p>
             <a:fld id="{F72C1BCF-1929-4F52-BF96-F3A2DD98F1D0}" type="datetimeFigureOut">
               <a:rPr lang="en-US" smtClean="0"/>
-              <a:t>11/16/23</a:t>
+              <a:t>11/17/2023</a:t>
             </a:fld>
             <a:endParaRPr lang="en-US"/>
           </a:p>
@@ -1819,7 +1819,7 @@
           <a:p>
             <a:fld id="{F72C1BCF-1929-4F52-BF96-F3A2DD98F1D0}" type="datetimeFigureOut">
               <a:rPr lang="en-US" smtClean="0"/>
-              <a:t>11/16/23</a:t>
+              <a:t>11/17/2023</a:t>
             </a:fld>
             <a:endParaRPr lang="en-US"/>
           </a:p>
@@ -2096,7 +2096,7 @@
           <a:p>
             <a:fld id="{F72C1BCF-1929-4F52-BF96-F3A2DD98F1D0}" type="datetimeFigureOut">
               <a:rPr lang="en-US" smtClean="0"/>
-              <a:t>11/16/23</a:t>
+              <a:t>11/17/2023</a:t>
             </a:fld>
             <a:endParaRPr lang="en-US"/>
           </a:p>
@@ -2353,7 +2353,7 @@
           <a:p>
             <a:fld id="{F72C1BCF-1929-4F52-BF96-F3A2DD98F1D0}" type="datetimeFigureOut">
               <a:rPr lang="en-US" smtClean="0"/>
-              <a:t>11/16/23</a:t>
+              <a:t>11/17/2023</a:t>
             </a:fld>
             <a:endParaRPr lang="en-US"/>
           </a:p>
@@ -2566,7 +2566,7 @@
           <a:p>
             <a:fld id="{F72C1BCF-1929-4F52-BF96-F3A2DD98F1D0}" type="datetimeFigureOut">
               <a:rPr lang="en-US" smtClean="0"/>
-              <a:t>11/16/23</a:t>
+              <a:t>11/17/2023</a:t>
             </a:fld>
             <a:endParaRPr lang="en-US"/>
           </a:p>
@@ -6915,6 +6915,654 @@
           </a:extLst>
         </p:spPr>
       </p:pic>
+      <p:sp>
+        <p:nvSpPr>
+          <p:cNvPr id="2" name="TextBox 1">
+            <a:extLst>
+              <a:ext uri="{FF2B5EF4-FFF2-40B4-BE49-F238E27FC236}">
+                <a16:creationId xmlns:a16="http://schemas.microsoft.com/office/drawing/2014/main" id="{46EA126B-3975-38B6-4724-496F77EB4987}"/>
+              </a:ext>
+            </a:extLst>
+          </p:cNvPr>
+          <p:cNvSpPr txBox="1"/>
+          <p:nvPr/>
+        </p:nvSpPr>
+        <p:spPr>
+          <a:xfrm>
+            <a:off x="5950162" y="16914969"/>
+            <a:ext cx="4251158" cy="523220"/>
+          </a:xfrm>
+          <a:prstGeom prst="rect">
+            <a:avLst/>
+          </a:prstGeom>
+          <a:noFill/>
+        </p:spPr>
+        <p:txBody>
+          <a:bodyPr wrap="square" rtlCol="0">
+            <a:spAutoFit/>
+          </a:bodyPr>
+          <a:lstStyle/>
+          <a:p>
+            <a:r>
+              <a:rPr lang="en-US" sz="2800" i="1" dirty="0">
+                <a:solidFill>
+                  <a:srgbClr val="0B5E90"/>
+                </a:solidFill>
+              </a:rPr>
+              <a:t>Geopandas</a:t>
+            </a:r>
+          </a:p>
+        </p:txBody>
+      </p:sp>
+      <p:sp>
+        <p:nvSpPr>
+          <p:cNvPr id="3" name="TextBox 2">
+            <a:extLst>
+              <a:ext uri="{FF2B5EF4-FFF2-40B4-BE49-F238E27FC236}">
+                <a16:creationId xmlns:a16="http://schemas.microsoft.com/office/drawing/2014/main" id="{A93FEF67-08BD-C315-20DF-B1C67BA5D233}"/>
+              </a:ext>
+            </a:extLst>
+          </p:cNvPr>
+          <p:cNvSpPr txBox="1"/>
+          <p:nvPr/>
+        </p:nvSpPr>
+        <p:spPr>
+          <a:xfrm>
+            <a:off x="5969290" y="4443042"/>
+            <a:ext cx="4251158" cy="523220"/>
+          </a:xfrm>
+          <a:prstGeom prst="rect">
+            <a:avLst/>
+          </a:prstGeom>
+          <a:noFill/>
+        </p:spPr>
+        <p:txBody>
+          <a:bodyPr wrap="square" rtlCol="0">
+            <a:spAutoFit/>
+          </a:bodyPr>
+          <a:lstStyle/>
+          <a:p>
+            <a:r>
+              <a:rPr lang="en-US" sz="2800" i="1" dirty="0" err="1">
+                <a:solidFill>
+                  <a:srgbClr val="0B5E90"/>
+                </a:solidFill>
+              </a:rPr>
+              <a:t>Rasterio</a:t>
+            </a:r>
+            <a:endParaRPr lang="en-US" sz="2800" i="1" dirty="0">
+              <a:solidFill>
+                <a:srgbClr val="0B5E90"/>
+              </a:solidFill>
+            </a:endParaRPr>
+          </a:p>
+        </p:txBody>
+      </p:sp>
+      <p:sp>
+        <p:nvSpPr>
+          <p:cNvPr id="5" name="TextBox 4">
+            <a:extLst>
+              <a:ext uri="{FF2B5EF4-FFF2-40B4-BE49-F238E27FC236}">
+                <a16:creationId xmlns:a16="http://schemas.microsoft.com/office/drawing/2014/main" id="{B80E158F-FADC-A277-937B-6FA8C6512599}"/>
+              </a:ext>
+            </a:extLst>
+          </p:cNvPr>
+          <p:cNvSpPr txBox="1"/>
+          <p:nvPr/>
+        </p:nvSpPr>
+        <p:spPr>
+          <a:xfrm>
+            <a:off x="3913796" y="6660096"/>
+            <a:ext cx="4251158" cy="523220"/>
+          </a:xfrm>
+          <a:prstGeom prst="rect">
+            <a:avLst/>
+          </a:prstGeom>
+          <a:noFill/>
+        </p:spPr>
+        <p:txBody>
+          <a:bodyPr wrap="square" rtlCol="0">
+            <a:spAutoFit/>
+          </a:bodyPr>
+          <a:lstStyle/>
+          <a:p>
+            <a:r>
+              <a:rPr lang="en-US" sz="2800" i="1" dirty="0">
+                <a:solidFill>
+                  <a:srgbClr val="0B5E90"/>
+                </a:solidFill>
+              </a:rPr>
+              <a:t>Shapely</a:t>
+            </a:r>
+          </a:p>
+        </p:txBody>
+      </p:sp>
+      <p:sp>
+        <p:nvSpPr>
+          <p:cNvPr id="7" name="TextBox 6">
+            <a:extLst>
+              <a:ext uri="{FF2B5EF4-FFF2-40B4-BE49-F238E27FC236}">
+                <a16:creationId xmlns:a16="http://schemas.microsoft.com/office/drawing/2014/main" id="{47C289BE-1BD1-4E1E-5D6B-C37BA27BF63E}"/>
+              </a:ext>
+            </a:extLst>
+          </p:cNvPr>
+          <p:cNvSpPr txBox="1"/>
+          <p:nvPr/>
+        </p:nvSpPr>
+        <p:spPr>
+          <a:xfrm>
+            <a:off x="8829808" y="8515963"/>
+            <a:ext cx="4251158" cy="523220"/>
+          </a:xfrm>
+          <a:prstGeom prst="rect">
+            <a:avLst/>
+          </a:prstGeom>
+          <a:noFill/>
+        </p:spPr>
+        <p:txBody>
+          <a:bodyPr wrap="square" rtlCol="0">
+            <a:spAutoFit/>
+          </a:bodyPr>
+          <a:lstStyle/>
+          <a:p>
+            <a:r>
+              <a:rPr lang="en-US" sz="2800" i="1" dirty="0" err="1">
+                <a:solidFill>
+                  <a:srgbClr val="0B5E90"/>
+                </a:solidFill>
+              </a:rPr>
+              <a:t>Rasterio</a:t>
+            </a:r>
+            <a:endParaRPr lang="en-US" sz="2800" i="1" dirty="0">
+              <a:solidFill>
+                <a:srgbClr val="0B5E90"/>
+              </a:solidFill>
+            </a:endParaRPr>
+          </a:p>
+        </p:txBody>
+      </p:sp>
+      <p:sp>
+        <p:nvSpPr>
+          <p:cNvPr id="8" name="TextBox 7">
+            <a:extLst>
+              <a:ext uri="{FF2B5EF4-FFF2-40B4-BE49-F238E27FC236}">
+                <a16:creationId xmlns:a16="http://schemas.microsoft.com/office/drawing/2014/main" id="{ECF88A88-80A9-4125-8A22-384D6DD9311C}"/>
+              </a:ext>
+            </a:extLst>
+          </p:cNvPr>
+          <p:cNvSpPr txBox="1"/>
+          <p:nvPr/>
+        </p:nvSpPr>
+        <p:spPr>
+          <a:xfrm>
+            <a:off x="12619534" y="2418736"/>
+            <a:ext cx="4251158" cy="523220"/>
+          </a:xfrm>
+          <a:prstGeom prst="rect">
+            <a:avLst/>
+          </a:prstGeom>
+          <a:noFill/>
+        </p:spPr>
+        <p:txBody>
+          <a:bodyPr wrap="square" rtlCol="0">
+            <a:spAutoFit/>
+          </a:bodyPr>
+          <a:lstStyle/>
+          <a:p>
+            <a:r>
+              <a:rPr lang="en-US" sz="2800" i="1" dirty="0">
+                <a:solidFill>
+                  <a:srgbClr val="0B5E90"/>
+                </a:solidFill>
+              </a:rPr>
+              <a:t>GDAL</a:t>
+            </a:r>
+          </a:p>
+        </p:txBody>
+      </p:sp>
+      <p:sp>
+        <p:nvSpPr>
+          <p:cNvPr id="11" name="TextBox 10">
+            <a:extLst>
+              <a:ext uri="{FF2B5EF4-FFF2-40B4-BE49-F238E27FC236}">
+                <a16:creationId xmlns:a16="http://schemas.microsoft.com/office/drawing/2014/main" id="{C99886C5-2362-5B20-C7D0-A225D333FE21}"/>
+              </a:ext>
+            </a:extLst>
+          </p:cNvPr>
+          <p:cNvSpPr txBox="1"/>
+          <p:nvPr/>
+        </p:nvSpPr>
+        <p:spPr>
+          <a:xfrm>
+            <a:off x="26414516" y="1613101"/>
+            <a:ext cx="4251158" cy="523220"/>
+          </a:xfrm>
+          <a:prstGeom prst="rect">
+            <a:avLst/>
+          </a:prstGeom>
+          <a:noFill/>
+        </p:spPr>
+        <p:txBody>
+          <a:bodyPr wrap="square" rtlCol="0">
+            <a:spAutoFit/>
+          </a:bodyPr>
+          <a:lstStyle/>
+          <a:p>
+            <a:r>
+              <a:rPr lang="en-US" sz="2800" i="1" dirty="0" err="1">
+                <a:solidFill>
+                  <a:srgbClr val="0B5E90"/>
+                </a:solidFill>
+              </a:rPr>
+              <a:t>Rasterio</a:t>
+            </a:r>
+            <a:endParaRPr lang="en-US" sz="2800" i="1" dirty="0">
+              <a:solidFill>
+                <a:srgbClr val="0B5E90"/>
+              </a:solidFill>
+            </a:endParaRPr>
+          </a:p>
+        </p:txBody>
+      </p:sp>
+      <p:sp>
+        <p:nvSpPr>
+          <p:cNvPr id="14" name="TextBox 13">
+            <a:extLst>
+              <a:ext uri="{FF2B5EF4-FFF2-40B4-BE49-F238E27FC236}">
+                <a16:creationId xmlns:a16="http://schemas.microsoft.com/office/drawing/2014/main" id="{CE0F999E-DD72-75F9-CB82-E25CFEA44804}"/>
+              </a:ext>
+            </a:extLst>
+          </p:cNvPr>
+          <p:cNvSpPr txBox="1"/>
+          <p:nvPr/>
+        </p:nvSpPr>
+        <p:spPr>
+          <a:xfrm>
+            <a:off x="20793937" y="7677348"/>
+            <a:ext cx="4251158" cy="523220"/>
+          </a:xfrm>
+          <a:prstGeom prst="rect">
+            <a:avLst/>
+          </a:prstGeom>
+          <a:noFill/>
+        </p:spPr>
+        <p:txBody>
+          <a:bodyPr wrap="square" rtlCol="0">
+            <a:spAutoFit/>
+          </a:bodyPr>
+          <a:lstStyle/>
+          <a:p>
+            <a:r>
+              <a:rPr lang="en-US" sz="2800" i="1" dirty="0" err="1">
+                <a:solidFill>
+                  <a:srgbClr val="0B5E90"/>
+                </a:solidFill>
+              </a:rPr>
+              <a:t>Rioxarray</a:t>
+            </a:r>
+            <a:endParaRPr lang="en-US" sz="2800" i="1" dirty="0">
+              <a:solidFill>
+                <a:srgbClr val="0B5E90"/>
+              </a:solidFill>
+            </a:endParaRPr>
+          </a:p>
+        </p:txBody>
+      </p:sp>
+      <p:sp>
+        <p:nvSpPr>
+          <p:cNvPr id="16" name="TextBox 15">
+            <a:extLst>
+              <a:ext uri="{FF2B5EF4-FFF2-40B4-BE49-F238E27FC236}">
+                <a16:creationId xmlns:a16="http://schemas.microsoft.com/office/drawing/2014/main" id="{BE118C1F-17DB-CB19-4405-381491326308}"/>
+              </a:ext>
+            </a:extLst>
+          </p:cNvPr>
+          <p:cNvSpPr txBox="1"/>
+          <p:nvPr/>
+        </p:nvSpPr>
+        <p:spPr>
+          <a:xfrm>
+            <a:off x="17038636" y="15731544"/>
+            <a:ext cx="4251158" cy="523220"/>
+          </a:xfrm>
+          <a:prstGeom prst="rect">
+            <a:avLst/>
+          </a:prstGeom>
+          <a:noFill/>
+        </p:spPr>
+        <p:txBody>
+          <a:bodyPr wrap="square" rtlCol="0">
+            <a:spAutoFit/>
+          </a:bodyPr>
+          <a:lstStyle/>
+          <a:p>
+            <a:r>
+              <a:rPr lang="en-US" sz="2800" i="1" dirty="0" err="1">
+                <a:solidFill>
+                  <a:srgbClr val="0B5E90"/>
+                </a:solidFill>
+              </a:rPr>
+              <a:t>Rioxarray</a:t>
+            </a:r>
+            <a:endParaRPr lang="en-US" sz="2800" i="1" dirty="0">
+              <a:solidFill>
+                <a:srgbClr val="0B5E90"/>
+              </a:solidFill>
+            </a:endParaRPr>
+          </a:p>
+        </p:txBody>
+      </p:sp>
+      <p:sp>
+        <p:nvSpPr>
+          <p:cNvPr id="23" name="TextBox 22">
+            <a:extLst>
+              <a:ext uri="{FF2B5EF4-FFF2-40B4-BE49-F238E27FC236}">
+                <a16:creationId xmlns:a16="http://schemas.microsoft.com/office/drawing/2014/main" id="{2BDA74A5-950F-181D-62A8-FBC2077E784B}"/>
+              </a:ext>
+            </a:extLst>
+          </p:cNvPr>
+          <p:cNvSpPr txBox="1"/>
+          <p:nvPr/>
+        </p:nvSpPr>
+        <p:spPr>
+          <a:xfrm>
+            <a:off x="23129503" y="15717263"/>
+            <a:ext cx="4251158" cy="523220"/>
+          </a:xfrm>
+          <a:prstGeom prst="rect">
+            <a:avLst/>
+          </a:prstGeom>
+          <a:noFill/>
+        </p:spPr>
+        <p:txBody>
+          <a:bodyPr wrap="square" rtlCol="0">
+            <a:spAutoFit/>
+          </a:bodyPr>
+          <a:lstStyle/>
+          <a:p>
+            <a:r>
+              <a:rPr lang="en-US" sz="2800" i="1" dirty="0" err="1">
+                <a:solidFill>
+                  <a:srgbClr val="0B5E90"/>
+                </a:solidFill>
+              </a:rPr>
+              <a:t>Rioxarray</a:t>
+            </a:r>
+            <a:endParaRPr lang="en-US" sz="2800" i="1" dirty="0">
+              <a:solidFill>
+                <a:srgbClr val="0B5E90"/>
+              </a:solidFill>
+            </a:endParaRPr>
+          </a:p>
+        </p:txBody>
+      </p:sp>
+      <p:sp>
+        <p:nvSpPr>
+          <p:cNvPr id="40" name="TextBox 39">
+            <a:extLst>
+              <a:ext uri="{FF2B5EF4-FFF2-40B4-BE49-F238E27FC236}">
+                <a16:creationId xmlns:a16="http://schemas.microsoft.com/office/drawing/2014/main" id="{242D51E5-815A-33F3-3CAA-E78FCF29E5C4}"/>
+              </a:ext>
+            </a:extLst>
+          </p:cNvPr>
+          <p:cNvSpPr txBox="1"/>
+          <p:nvPr/>
+        </p:nvSpPr>
+        <p:spPr>
+          <a:xfrm>
+            <a:off x="21416963" y="17816468"/>
+            <a:ext cx="4251158" cy="523220"/>
+          </a:xfrm>
+          <a:prstGeom prst="rect">
+            <a:avLst/>
+          </a:prstGeom>
+          <a:noFill/>
+        </p:spPr>
+        <p:txBody>
+          <a:bodyPr wrap="square" rtlCol="0">
+            <a:spAutoFit/>
+          </a:bodyPr>
+          <a:lstStyle/>
+          <a:p>
+            <a:r>
+              <a:rPr lang="en-US" sz="2800" i="1" dirty="0" err="1">
+                <a:solidFill>
+                  <a:srgbClr val="0B5E90"/>
+                </a:solidFill>
+              </a:rPr>
+              <a:t>Rasterio</a:t>
+            </a:r>
+            <a:endParaRPr lang="en-US" sz="2800" i="1" dirty="0">
+              <a:solidFill>
+                <a:srgbClr val="0B5E90"/>
+              </a:solidFill>
+            </a:endParaRPr>
+          </a:p>
+        </p:txBody>
+      </p:sp>
+      <p:sp>
+        <p:nvSpPr>
+          <p:cNvPr id="41" name="TextBox 40">
+            <a:extLst>
+              <a:ext uri="{FF2B5EF4-FFF2-40B4-BE49-F238E27FC236}">
+                <a16:creationId xmlns:a16="http://schemas.microsoft.com/office/drawing/2014/main" id="{F53A44D9-1C9A-CF0F-919C-9AFC12D13CD8}"/>
+              </a:ext>
+            </a:extLst>
+          </p:cNvPr>
+          <p:cNvSpPr txBox="1"/>
+          <p:nvPr/>
+        </p:nvSpPr>
+        <p:spPr>
+          <a:xfrm>
+            <a:off x="17038636" y="11818092"/>
+            <a:ext cx="4251158" cy="523220"/>
+          </a:xfrm>
+          <a:prstGeom prst="rect">
+            <a:avLst/>
+          </a:prstGeom>
+          <a:noFill/>
+        </p:spPr>
+        <p:txBody>
+          <a:bodyPr wrap="square" rtlCol="0">
+            <a:spAutoFit/>
+          </a:bodyPr>
+          <a:lstStyle/>
+          <a:p>
+            <a:r>
+              <a:rPr lang="en-US" sz="2800" i="1" dirty="0" err="1">
+                <a:solidFill>
+                  <a:srgbClr val="0B5E90"/>
+                </a:solidFill>
+              </a:rPr>
+              <a:t>Rasterio</a:t>
+            </a:r>
+            <a:endParaRPr lang="en-US" sz="2800" i="1" dirty="0">
+              <a:solidFill>
+                <a:srgbClr val="0B5E90"/>
+              </a:solidFill>
+            </a:endParaRPr>
+          </a:p>
+        </p:txBody>
+      </p:sp>
+      <p:sp>
+        <p:nvSpPr>
+          <p:cNvPr id="43" name="TextBox 42">
+            <a:extLst>
+              <a:ext uri="{FF2B5EF4-FFF2-40B4-BE49-F238E27FC236}">
+                <a16:creationId xmlns:a16="http://schemas.microsoft.com/office/drawing/2014/main" id="{88705B38-63A0-8095-E7AD-464045FEC981}"/>
+              </a:ext>
+            </a:extLst>
+          </p:cNvPr>
+          <p:cNvSpPr txBox="1"/>
+          <p:nvPr/>
+        </p:nvSpPr>
+        <p:spPr>
+          <a:xfrm>
+            <a:off x="23398781" y="11831837"/>
+            <a:ext cx="4251158" cy="523220"/>
+          </a:xfrm>
+          <a:prstGeom prst="rect">
+            <a:avLst/>
+          </a:prstGeom>
+          <a:noFill/>
+        </p:spPr>
+        <p:txBody>
+          <a:bodyPr wrap="square" rtlCol="0">
+            <a:spAutoFit/>
+          </a:bodyPr>
+          <a:lstStyle/>
+          <a:p>
+            <a:r>
+              <a:rPr lang="en-US" sz="2800" i="1" dirty="0" err="1">
+                <a:solidFill>
+                  <a:srgbClr val="0B5E90"/>
+                </a:solidFill>
+              </a:rPr>
+              <a:t>Rasterio</a:t>
+            </a:r>
+            <a:endParaRPr lang="en-US" sz="2800" i="1" dirty="0">
+              <a:solidFill>
+                <a:srgbClr val="0B5E90"/>
+              </a:solidFill>
+            </a:endParaRPr>
+          </a:p>
+        </p:txBody>
+      </p:sp>
+      <p:sp>
+        <p:nvSpPr>
+          <p:cNvPr id="44" name="TextBox 43">
+            <a:extLst>
+              <a:ext uri="{FF2B5EF4-FFF2-40B4-BE49-F238E27FC236}">
+                <a16:creationId xmlns:a16="http://schemas.microsoft.com/office/drawing/2014/main" id="{6BFD7322-6DAB-A783-E3C9-4575CD7787F8}"/>
+              </a:ext>
+            </a:extLst>
+          </p:cNvPr>
+          <p:cNvSpPr txBox="1"/>
+          <p:nvPr/>
+        </p:nvSpPr>
+        <p:spPr>
+          <a:xfrm>
+            <a:off x="5950162" y="13785951"/>
+            <a:ext cx="4251158" cy="523220"/>
+          </a:xfrm>
+          <a:prstGeom prst="rect">
+            <a:avLst/>
+          </a:prstGeom>
+          <a:noFill/>
+        </p:spPr>
+        <p:txBody>
+          <a:bodyPr wrap="square" rtlCol="0">
+            <a:spAutoFit/>
+          </a:bodyPr>
+          <a:lstStyle/>
+          <a:p>
+            <a:r>
+              <a:rPr lang="en-US" sz="2800" i="1" dirty="0">
+                <a:solidFill>
+                  <a:srgbClr val="0B5E90"/>
+                </a:solidFill>
+              </a:rPr>
+              <a:t>Geopandas, </a:t>
+            </a:r>
+            <a:r>
+              <a:rPr lang="en-US" sz="2800" i="1" dirty="0" err="1">
+                <a:solidFill>
+                  <a:srgbClr val="0B5E90"/>
+                </a:solidFill>
+              </a:rPr>
+              <a:t>Rasterio</a:t>
+            </a:r>
+            <a:endParaRPr lang="en-US" sz="2800" i="1" dirty="0">
+              <a:solidFill>
+                <a:srgbClr val="0B5E90"/>
+              </a:solidFill>
+            </a:endParaRPr>
+          </a:p>
+        </p:txBody>
+      </p:sp>
+      <p:sp>
+        <p:nvSpPr>
+          <p:cNvPr id="50" name="TextBox 49">
+            <a:extLst>
+              <a:ext uri="{FF2B5EF4-FFF2-40B4-BE49-F238E27FC236}">
+                <a16:creationId xmlns:a16="http://schemas.microsoft.com/office/drawing/2014/main" id="{B32507F9-877B-FED7-4A24-599FA03A4583}"/>
+              </a:ext>
+            </a:extLst>
+          </p:cNvPr>
+          <p:cNvSpPr txBox="1"/>
+          <p:nvPr/>
+        </p:nvSpPr>
+        <p:spPr>
+          <a:xfrm>
+            <a:off x="12581982" y="13693746"/>
+            <a:ext cx="4251158" cy="523220"/>
+          </a:xfrm>
+          <a:prstGeom prst="rect">
+            <a:avLst/>
+          </a:prstGeom>
+          <a:noFill/>
+        </p:spPr>
+        <p:txBody>
+          <a:bodyPr wrap="square" rtlCol="0">
+            <a:spAutoFit/>
+          </a:bodyPr>
+          <a:lstStyle/>
+          <a:p>
+            <a:r>
+              <a:rPr lang="en-US" sz="2800" i="1" dirty="0" err="1">
+                <a:solidFill>
+                  <a:srgbClr val="0B5E90"/>
+                </a:solidFill>
+              </a:rPr>
+              <a:t>Rasterio</a:t>
+            </a:r>
+            <a:endParaRPr lang="en-US" sz="2800" i="1" dirty="0">
+              <a:solidFill>
+                <a:srgbClr val="0B5E90"/>
+              </a:solidFill>
+            </a:endParaRPr>
+          </a:p>
+        </p:txBody>
+      </p:sp>
+      <p:sp>
+        <p:nvSpPr>
+          <p:cNvPr id="51" name="TextBox 50">
+            <a:extLst>
+              <a:ext uri="{FF2B5EF4-FFF2-40B4-BE49-F238E27FC236}">
+                <a16:creationId xmlns:a16="http://schemas.microsoft.com/office/drawing/2014/main" id="{43F17F7F-484A-B098-1B7F-774507FA5740}"/>
+              </a:ext>
+            </a:extLst>
+          </p:cNvPr>
+          <p:cNvSpPr txBox="1"/>
+          <p:nvPr/>
+        </p:nvSpPr>
+        <p:spPr>
+          <a:xfrm>
+            <a:off x="6090986" y="2904542"/>
+            <a:ext cx="4251158" cy="523220"/>
+          </a:xfrm>
+          <a:prstGeom prst="rect">
+            <a:avLst/>
+          </a:prstGeom>
+          <a:noFill/>
+        </p:spPr>
+        <p:txBody>
+          <a:bodyPr wrap="square" rtlCol="0">
+            <a:spAutoFit/>
+          </a:bodyPr>
+          <a:lstStyle/>
+          <a:p>
+            <a:r>
+              <a:rPr lang="en-US" sz="2800" i="1" dirty="0">
+                <a:solidFill>
+                  <a:srgbClr val="0B5E90"/>
+                </a:solidFill>
+              </a:rPr>
+              <a:t>Geopandas</a:t>
+            </a:r>
+          </a:p>
+        </p:txBody>
+      </p:sp>
     </p:spTree>
     <p:extLst>
       <p:ext uri="{BB962C8B-B14F-4D97-AF65-F5344CB8AC3E}">

</xml_diff>